<commit_message>
adjust frequency plan switches to embrace AU915
</commit_message>
<xml_diff>
--- a/Docs/rfsel.pptx
+++ b/Docs/rfsel.pptx
@@ -197,7 +197,7 @@
           <a:p>
             <a:fld id="{2FBA757A-6025-5A42-AE6E-F4BC141BDF65}" type="datetimeFigureOut">
               <a:rPr lang="en-US" smtClean="0"/>
-              <a:t>7/10/21</a:t>
+              <a:t>10/9/2021</a:t>
             </a:fld>
             <a:endParaRPr lang="en-US"/>
           </a:p>
@@ -695,7 +695,7 @@
           <a:p>
             <a:fld id="{51B3A7B4-E0E3-3348-8640-EBFD71607F9D}" type="datetimeFigureOut">
               <a:rPr lang="en-US" smtClean="0"/>
-              <a:t>7/10/21</a:t>
+              <a:t>10/9/2021</a:t>
             </a:fld>
             <a:endParaRPr lang="en-US"/>
           </a:p>
@@ -893,7 +893,7 @@
           <a:p>
             <a:fld id="{51B3A7B4-E0E3-3348-8640-EBFD71607F9D}" type="datetimeFigureOut">
               <a:rPr lang="en-US" smtClean="0"/>
-              <a:t>7/10/21</a:t>
+              <a:t>10/9/2021</a:t>
             </a:fld>
             <a:endParaRPr lang="en-US"/>
           </a:p>
@@ -1101,7 +1101,7 @@
           <a:p>
             <a:fld id="{51B3A7B4-E0E3-3348-8640-EBFD71607F9D}" type="datetimeFigureOut">
               <a:rPr lang="en-US" smtClean="0"/>
-              <a:t>7/10/21</a:t>
+              <a:t>10/9/2021</a:t>
             </a:fld>
             <a:endParaRPr lang="en-US"/>
           </a:p>
@@ -1299,7 +1299,7 @@
           <a:p>
             <a:fld id="{51B3A7B4-E0E3-3348-8640-EBFD71607F9D}" type="datetimeFigureOut">
               <a:rPr lang="en-US" smtClean="0"/>
-              <a:t>7/10/21</a:t>
+              <a:t>10/9/2021</a:t>
             </a:fld>
             <a:endParaRPr lang="en-US"/>
           </a:p>
@@ -1574,7 +1574,7 @@
           <a:p>
             <a:fld id="{51B3A7B4-E0E3-3348-8640-EBFD71607F9D}" type="datetimeFigureOut">
               <a:rPr lang="en-US" smtClean="0"/>
-              <a:t>7/10/21</a:t>
+              <a:t>10/9/2021</a:t>
             </a:fld>
             <a:endParaRPr lang="en-US"/>
           </a:p>
@@ -1839,7 +1839,7 @@
           <a:p>
             <a:fld id="{51B3A7B4-E0E3-3348-8640-EBFD71607F9D}" type="datetimeFigureOut">
               <a:rPr lang="en-US" smtClean="0"/>
-              <a:t>7/10/21</a:t>
+              <a:t>10/9/2021</a:t>
             </a:fld>
             <a:endParaRPr lang="en-US"/>
           </a:p>
@@ -2251,7 +2251,7 @@
           <a:p>
             <a:fld id="{51B3A7B4-E0E3-3348-8640-EBFD71607F9D}" type="datetimeFigureOut">
               <a:rPr lang="en-US" smtClean="0"/>
-              <a:t>7/10/21</a:t>
+              <a:t>10/9/2021</a:t>
             </a:fld>
             <a:endParaRPr lang="en-US"/>
           </a:p>
@@ -2392,7 +2392,7 @@
           <a:p>
             <a:fld id="{51B3A7B4-E0E3-3348-8640-EBFD71607F9D}" type="datetimeFigureOut">
               <a:rPr lang="en-US" smtClean="0"/>
-              <a:t>7/10/21</a:t>
+              <a:t>10/9/2021</a:t>
             </a:fld>
             <a:endParaRPr lang="en-US"/>
           </a:p>
@@ -2505,7 +2505,7 @@
           <a:p>
             <a:fld id="{51B3A7B4-E0E3-3348-8640-EBFD71607F9D}" type="datetimeFigureOut">
               <a:rPr lang="en-US" smtClean="0"/>
-              <a:t>7/10/21</a:t>
+              <a:t>10/9/2021</a:t>
             </a:fld>
             <a:endParaRPr lang="en-US"/>
           </a:p>
@@ -2816,7 +2816,7 @@
           <a:p>
             <a:fld id="{51B3A7B4-E0E3-3348-8640-EBFD71607F9D}" type="datetimeFigureOut">
               <a:rPr lang="en-US" smtClean="0"/>
-              <a:t>7/10/21</a:t>
+              <a:t>10/9/2021</a:t>
             </a:fld>
             <a:endParaRPr lang="en-US"/>
           </a:p>
@@ -3104,7 +3104,7 @@
           <a:p>
             <a:fld id="{51B3A7B4-E0E3-3348-8640-EBFD71607F9D}" type="datetimeFigureOut">
               <a:rPr lang="en-US" smtClean="0"/>
-              <a:t>7/10/21</a:t>
+              <a:t>10/9/2021</a:t>
             </a:fld>
             <a:endParaRPr lang="en-US"/>
           </a:p>
@@ -3345,7 +3345,7 @@
           <a:p>
             <a:fld id="{51B3A7B4-E0E3-3348-8640-EBFD71607F9D}" type="datetimeFigureOut">
               <a:rPr lang="en-US" smtClean="0"/>
-              <a:t>7/10/21</a:t>
+              <a:t>10/9/2021</a:t>
             </a:fld>
             <a:endParaRPr lang="en-US"/>
           </a:p>
@@ -4285,7 +4285,7 @@
             <a:pPr algn="ctr"/>
             <a:r>
               <a:rPr lang="en-US" dirty="0"/>
-              <a:t>REFSEL_0</a:t>
+              <a:t>REFSEL_1</a:t>
             </a:r>
           </a:p>
         </p:txBody>
@@ -5240,9 +5240,10 @@
           <a:p>
             <a:pPr algn="ctr"/>
             <a:r>
-              <a:rPr lang="en-US" dirty="0"/>
-              <a:t>REFSEL_1</a:t>
-            </a:r>
+              <a:rPr lang="en-US"/>
+              <a:t>REFSEL_0</a:t>
+            </a:r>
+            <a:endParaRPr lang="en-US" dirty="0"/>
           </a:p>
         </p:txBody>
       </p:sp>

</xml_diff>